<commit_message>
Update gitbook 2025-09-04 15:07:32
</commit_message>
<xml_diff>
--- a/Week02/NameThatElement.pptx
+++ b/Week02/NameThatElement.pptx
@@ -5,7 +5,7 @@
     <p:sldMasterId id="2147483676" r:id="rId1"/>
   </p:sldMasterIdLst>
   <p:notesMasterIdLst>
-    <p:notesMasterId r:id="rId13"/>
+    <p:notesMasterId r:id="rId18"/>
   </p:notesMasterIdLst>
   <p:sldIdLst>
     <p:sldId id="256" r:id="rId2"/>
@@ -18,26 +18,31 @@
     <p:sldId id="325" r:id="rId9"/>
     <p:sldId id="326" r:id="rId10"/>
     <p:sldId id="327" r:id="rId11"/>
-    <p:sldId id="328" r:id="rId12"/>
+    <p:sldId id="329" r:id="rId12"/>
+    <p:sldId id="330" r:id="rId13"/>
+    <p:sldId id="331" r:id="rId14"/>
+    <p:sldId id="332" r:id="rId15"/>
+    <p:sldId id="328" r:id="rId16"/>
+    <p:sldId id="333" r:id="rId17"/>
   </p:sldIdLst>
   <p:sldSz cx="9144000" cy="5143500" type="screen16x9"/>
   <p:notesSz cx="6858000" cy="9144000"/>
   <p:embeddedFontLst>
     <p:embeddedFont>
       <p:font typeface="Consolas" panose="020B0609020204030204" pitchFamily="49" charset="0"/>
-      <p:regular r:id="rId14"/>
-      <p:bold r:id="rId15"/>
-      <p:italic r:id="rId16"/>
-      <p:boldItalic r:id="rId17"/>
+      <p:regular r:id="rId19"/>
+      <p:bold r:id="rId20"/>
+      <p:italic r:id="rId21"/>
+      <p:boldItalic r:id="rId22"/>
     </p:embeddedFont>
     <p:embeddedFont>
       <p:font typeface="Krona One" panose="020B0604020202020204" charset="0"/>
-      <p:regular r:id="rId18"/>
+      <p:regular r:id="rId23"/>
     </p:embeddedFont>
     <p:embeddedFont>
       <p:font typeface="Miriam Libre" panose="00000500000000000000" pitchFamily="2" charset="-79"/>
-      <p:regular r:id="rId19"/>
-      <p:bold r:id="rId20"/>
+      <p:regular r:id="rId24"/>
+      <p:bold r:id="rId25"/>
     </p:embeddedFont>
   </p:embeddedFontLst>
   <p:defaultTextStyle>
@@ -959,6 +964,461 @@
   <p:cSld>
     <p:spTree>
       <p:nvGrpSpPr>
+        <p:cNvPr id="1" name="">
+          <a:extLst>
+            <a:ext uri="{FF2B5EF4-FFF2-40B4-BE49-F238E27FC236}">
+              <a16:creationId xmlns:a16="http://schemas.microsoft.com/office/drawing/2014/main" id="{9E5C24C2-27EB-90DB-35E2-A5F741050C3E}"/>
+            </a:ext>
+          </a:extLst>
+        </p:cNvPr>
+        <p:cNvGrpSpPr/>
+        <p:nvPr/>
+      </p:nvGrpSpPr>
+      <p:grpSpPr>
+        <a:xfrm>
+          <a:off x="0" y="0"/>
+          <a:ext cx="0" cy="0"/>
+          <a:chOff x="0" y="0"/>
+          <a:chExt cx="0" cy="0"/>
+        </a:xfrm>
+      </p:grpSpPr>
+      <p:sp>
+        <p:nvSpPr>
+          <p:cNvPr id="2" name="Slide Image Placeholder 1">
+            <a:extLst>
+              <a:ext uri="{FF2B5EF4-FFF2-40B4-BE49-F238E27FC236}">
+                <a16:creationId xmlns:a16="http://schemas.microsoft.com/office/drawing/2014/main" id="{72F36715-2D14-7432-032B-8B3EC9E7F16F}"/>
+              </a:ext>
+            </a:extLst>
+          </p:cNvPr>
+          <p:cNvSpPr>
+            <a:spLocks noGrp="1" noRot="1" noChangeAspect="1"/>
+          </p:cNvSpPr>
+          <p:nvPr>
+            <p:ph type="sldImg"/>
+          </p:nvPr>
+        </p:nvSpPr>
+        <p:spPr>
+          <a:xfrm>
+            <a:off x="381000" y="685800"/>
+            <a:ext cx="6096000" cy="3429000"/>
+          </a:xfrm>
+        </p:spPr>
+      </p:sp>
+      <p:sp>
+        <p:nvSpPr>
+          <p:cNvPr id="3" name="Notes Placeholder 2">
+            <a:extLst>
+              <a:ext uri="{FF2B5EF4-FFF2-40B4-BE49-F238E27FC236}">
+                <a16:creationId xmlns:a16="http://schemas.microsoft.com/office/drawing/2014/main" id="{BECB1048-3DB6-097D-9861-152DB8609B6E}"/>
+              </a:ext>
+            </a:extLst>
+          </p:cNvPr>
+          <p:cNvSpPr>
+            <a:spLocks noGrp="1"/>
+          </p:cNvSpPr>
+          <p:nvPr>
+            <p:ph type="body" idx="1"/>
+          </p:nvPr>
+        </p:nvSpPr>
+        <p:spPr/>
+        <p:txBody>
+          <a:bodyPr/>
+          <a:lstStyle/>
+          <a:p>
+            <a:endParaRPr lang="en-US" dirty="0"/>
+          </a:p>
+        </p:txBody>
+      </p:sp>
+      <p:sp>
+        <p:nvSpPr>
+          <p:cNvPr id="4" name="Slide Number Placeholder 3">
+            <a:extLst>
+              <a:ext uri="{FF2B5EF4-FFF2-40B4-BE49-F238E27FC236}">
+                <a16:creationId xmlns:a16="http://schemas.microsoft.com/office/drawing/2014/main" id="{51A4ECAA-5652-4BC9-0BD6-19B9AD840207}"/>
+              </a:ext>
+            </a:extLst>
+          </p:cNvPr>
+          <p:cNvSpPr>
+            <a:spLocks noGrp="1"/>
+          </p:cNvSpPr>
+          <p:nvPr>
+            <p:ph type="sldNum" sz="quarter" idx="10"/>
+          </p:nvPr>
+        </p:nvSpPr>
+        <p:spPr/>
+        <p:txBody>
+          <a:bodyPr/>
+          <a:lstStyle/>
+          <a:p>
+            <a:fld id="{DEC8F7F9-57EC-49CF-9FCD-2B781E4B449F}" type="slidenum">
+              <a:rPr lang="en-US" smtClean="0"/>
+              <a:t>11</a:t>
+            </a:fld>
+            <a:endParaRPr lang="en-US"/>
+          </a:p>
+        </p:txBody>
+      </p:sp>
+    </p:spTree>
+    <p:extLst>
+      <p:ext uri="{BB962C8B-B14F-4D97-AF65-F5344CB8AC3E}">
+        <p14:creationId xmlns:p14="http://schemas.microsoft.com/office/powerpoint/2010/main" val="2385496575"/>
+      </p:ext>
+    </p:extLst>
+  </p:cSld>
+  <p:clrMapOvr>
+    <a:masterClrMapping/>
+  </p:clrMapOvr>
+</p:notes>
+</file>
+
+<file path=ppt/notesSlides/notesSlide12.xml><?xml version="1.0" encoding="utf-8"?>
+<p:notes xmlns:a="http://schemas.openxmlformats.org/drawingml/2006/main" xmlns:r="http://schemas.openxmlformats.org/officeDocument/2006/relationships" xmlns:p="http://schemas.openxmlformats.org/presentationml/2006/main">
+  <p:cSld>
+    <p:spTree>
+      <p:nvGrpSpPr>
+        <p:cNvPr id="1" name="">
+          <a:extLst>
+            <a:ext uri="{FF2B5EF4-FFF2-40B4-BE49-F238E27FC236}">
+              <a16:creationId xmlns:a16="http://schemas.microsoft.com/office/drawing/2014/main" id="{54D04872-6218-26F7-939A-76C7FE0A5AAB}"/>
+            </a:ext>
+          </a:extLst>
+        </p:cNvPr>
+        <p:cNvGrpSpPr/>
+        <p:nvPr/>
+      </p:nvGrpSpPr>
+      <p:grpSpPr>
+        <a:xfrm>
+          <a:off x="0" y="0"/>
+          <a:ext cx="0" cy="0"/>
+          <a:chOff x="0" y="0"/>
+          <a:chExt cx="0" cy="0"/>
+        </a:xfrm>
+      </p:grpSpPr>
+      <p:sp>
+        <p:nvSpPr>
+          <p:cNvPr id="2" name="Slide Image Placeholder 1">
+            <a:extLst>
+              <a:ext uri="{FF2B5EF4-FFF2-40B4-BE49-F238E27FC236}">
+                <a16:creationId xmlns:a16="http://schemas.microsoft.com/office/drawing/2014/main" id="{A9C37713-78C3-02BD-13F4-58008A461225}"/>
+              </a:ext>
+            </a:extLst>
+          </p:cNvPr>
+          <p:cNvSpPr>
+            <a:spLocks noGrp="1" noRot="1" noChangeAspect="1"/>
+          </p:cNvSpPr>
+          <p:nvPr>
+            <p:ph type="sldImg"/>
+          </p:nvPr>
+        </p:nvSpPr>
+        <p:spPr>
+          <a:xfrm>
+            <a:off x="381000" y="685800"/>
+            <a:ext cx="6096000" cy="3429000"/>
+          </a:xfrm>
+        </p:spPr>
+      </p:sp>
+      <p:sp>
+        <p:nvSpPr>
+          <p:cNvPr id="3" name="Notes Placeholder 2">
+            <a:extLst>
+              <a:ext uri="{FF2B5EF4-FFF2-40B4-BE49-F238E27FC236}">
+                <a16:creationId xmlns:a16="http://schemas.microsoft.com/office/drawing/2014/main" id="{E5359520-D004-0276-223E-1B6F45BB288A}"/>
+              </a:ext>
+            </a:extLst>
+          </p:cNvPr>
+          <p:cNvSpPr>
+            <a:spLocks noGrp="1"/>
+          </p:cNvSpPr>
+          <p:nvPr>
+            <p:ph type="body" idx="1"/>
+          </p:nvPr>
+        </p:nvSpPr>
+        <p:spPr/>
+        <p:txBody>
+          <a:bodyPr/>
+          <a:lstStyle/>
+          <a:p>
+            <a:endParaRPr lang="en-US" dirty="0"/>
+          </a:p>
+        </p:txBody>
+      </p:sp>
+      <p:sp>
+        <p:nvSpPr>
+          <p:cNvPr id="4" name="Slide Number Placeholder 3">
+            <a:extLst>
+              <a:ext uri="{FF2B5EF4-FFF2-40B4-BE49-F238E27FC236}">
+                <a16:creationId xmlns:a16="http://schemas.microsoft.com/office/drawing/2014/main" id="{650E03BA-3798-0CC7-E836-4EBD07B33093}"/>
+              </a:ext>
+            </a:extLst>
+          </p:cNvPr>
+          <p:cNvSpPr>
+            <a:spLocks noGrp="1"/>
+          </p:cNvSpPr>
+          <p:nvPr>
+            <p:ph type="sldNum" sz="quarter" idx="10"/>
+          </p:nvPr>
+        </p:nvSpPr>
+        <p:spPr/>
+        <p:txBody>
+          <a:bodyPr/>
+          <a:lstStyle/>
+          <a:p>
+            <a:fld id="{DEC8F7F9-57EC-49CF-9FCD-2B781E4B449F}" type="slidenum">
+              <a:rPr lang="en-US" smtClean="0"/>
+              <a:t>12</a:t>
+            </a:fld>
+            <a:endParaRPr lang="en-US"/>
+          </a:p>
+        </p:txBody>
+      </p:sp>
+    </p:spTree>
+    <p:extLst>
+      <p:ext uri="{BB962C8B-B14F-4D97-AF65-F5344CB8AC3E}">
+        <p14:creationId xmlns:p14="http://schemas.microsoft.com/office/powerpoint/2010/main" val="4110296922"/>
+      </p:ext>
+    </p:extLst>
+  </p:cSld>
+  <p:clrMapOvr>
+    <a:masterClrMapping/>
+  </p:clrMapOvr>
+</p:notes>
+</file>
+
+<file path=ppt/notesSlides/notesSlide13.xml><?xml version="1.0" encoding="utf-8"?>
+<p:notes xmlns:a="http://schemas.openxmlformats.org/drawingml/2006/main" xmlns:r="http://schemas.openxmlformats.org/officeDocument/2006/relationships" xmlns:p="http://schemas.openxmlformats.org/presentationml/2006/main">
+  <p:cSld>
+    <p:spTree>
+      <p:nvGrpSpPr>
+        <p:cNvPr id="1" name="">
+          <a:extLst>
+            <a:ext uri="{FF2B5EF4-FFF2-40B4-BE49-F238E27FC236}">
+              <a16:creationId xmlns:a16="http://schemas.microsoft.com/office/drawing/2014/main" id="{25C0058B-4CCF-E039-E9C8-9D4822D786B1}"/>
+            </a:ext>
+          </a:extLst>
+        </p:cNvPr>
+        <p:cNvGrpSpPr/>
+        <p:nvPr/>
+      </p:nvGrpSpPr>
+      <p:grpSpPr>
+        <a:xfrm>
+          <a:off x="0" y="0"/>
+          <a:ext cx="0" cy="0"/>
+          <a:chOff x="0" y="0"/>
+          <a:chExt cx="0" cy="0"/>
+        </a:xfrm>
+      </p:grpSpPr>
+      <p:sp>
+        <p:nvSpPr>
+          <p:cNvPr id="2" name="Slide Image Placeholder 1">
+            <a:extLst>
+              <a:ext uri="{FF2B5EF4-FFF2-40B4-BE49-F238E27FC236}">
+                <a16:creationId xmlns:a16="http://schemas.microsoft.com/office/drawing/2014/main" id="{DE3BC709-E20B-23C2-54EC-91EE535D5E59}"/>
+              </a:ext>
+            </a:extLst>
+          </p:cNvPr>
+          <p:cNvSpPr>
+            <a:spLocks noGrp="1" noRot="1" noChangeAspect="1"/>
+          </p:cNvSpPr>
+          <p:nvPr>
+            <p:ph type="sldImg"/>
+          </p:nvPr>
+        </p:nvSpPr>
+        <p:spPr>
+          <a:xfrm>
+            <a:off x="381000" y="685800"/>
+            <a:ext cx="6096000" cy="3429000"/>
+          </a:xfrm>
+        </p:spPr>
+      </p:sp>
+      <p:sp>
+        <p:nvSpPr>
+          <p:cNvPr id="3" name="Notes Placeholder 2">
+            <a:extLst>
+              <a:ext uri="{FF2B5EF4-FFF2-40B4-BE49-F238E27FC236}">
+                <a16:creationId xmlns:a16="http://schemas.microsoft.com/office/drawing/2014/main" id="{63290DE4-1B53-A17C-4519-E4B6D12DE6D3}"/>
+              </a:ext>
+            </a:extLst>
+          </p:cNvPr>
+          <p:cNvSpPr>
+            <a:spLocks noGrp="1"/>
+          </p:cNvSpPr>
+          <p:nvPr>
+            <p:ph type="body" idx="1"/>
+          </p:nvPr>
+        </p:nvSpPr>
+        <p:spPr/>
+        <p:txBody>
+          <a:bodyPr/>
+          <a:lstStyle/>
+          <a:p>
+            <a:r>
+              <a:rPr lang="en-US" dirty="0"/>
+              <a:t>\</a:t>
+            </a:r>
+          </a:p>
+        </p:txBody>
+      </p:sp>
+      <p:sp>
+        <p:nvSpPr>
+          <p:cNvPr id="4" name="Slide Number Placeholder 3">
+            <a:extLst>
+              <a:ext uri="{FF2B5EF4-FFF2-40B4-BE49-F238E27FC236}">
+                <a16:creationId xmlns:a16="http://schemas.microsoft.com/office/drawing/2014/main" id="{DDAF6582-9AED-5BEF-1FAB-60922B696AC6}"/>
+              </a:ext>
+            </a:extLst>
+          </p:cNvPr>
+          <p:cNvSpPr>
+            <a:spLocks noGrp="1"/>
+          </p:cNvSpPr>
+          <p:nvPr>
+            <p:ph type="sldNum" sz="quarter" idx="10"/>
+          </p:nvPr>
+        </p:nvSpPr>
+        <p:spPr/>
+        <p:txBody>
+          <a:bodyPr/>
+          <a:lstStyle/>
+          <a:p>
+            <a:fld id="{DEC8F7F9-57EC-49CF-9FCD-2B781E4B449F}" type="slidenum">
+              <a:rPr lang="en-US" smtClean="0"/>
+              <a:t>13</a:t>
+            </a:fld>
+            <a:endParaRPr lang="en-US"/>
+          </a:p>
+        </p:txBody>
+      </p:sp>
+    </p:spTree>
+    <p:extLst>
+      <p:ext uri="{BB962C8B-B14F-4D97-AF65-F5344CB8AC3E}">
+        <p14:creationId xmlns:p14="http://schemas.microsoft.com/office/powerpoint/2010/main" val="4246910846"/>
+      </p:ext>
+    </p:extLst>
+  </p:cSld>
+  <p:clrMapOvr>
+    <a:masterClrMapping/>
+  </p:clrMapOvr>
+</p:notes>
+</file>
+
+<file path=ppt/notesSlides/notesSlide14.xml><?xml version="1.0" encoding="utf-8"?>
+<p:notes xmlns:a="http://schemas.openxmlformats.org/drawingml/2006/main" xmlns:r="http://schemas.openxmlformats.org/officeDocument/2006/relationships" xmlns:p="http://schemas.openxmlformats.org/presentationml/2006/main">
+  <p:cSld>
+    <p:spTree>
+      <p:nvGrpSpPr>
+        <p:cNvPr id="1" name="">
+          <a:extLst>
+            <a:ext uri="{FF2B5EF4-FFF2-40B4-BE49-F238E27FC236}">
+              <a16:creationId xmlns:a16="http://schemas.microsoft.com/office/drawing/2014/main" id="{169C9B0E-4779-2604-6CB8-BA074C09E223}"/>
+            </a:ext>
+          </a:extLst>
+        </p:cNvPr>
+        <p:cNvGrpSpPr/>
+        <p:nvPr/>
+      </p:nvGrpSpPr>
+      <p:grpSpPr>
+        <a:xfrm>
+          <a:off x="0" y="0"/>
+          <a:ext cx="0" cy="0"/>
+          <a:chOff x="0" y="0"/>
+          <a:chExt cx="0" cy="0"/>
+        </a:xfrm>
+      </p:grpSpPr>
+      <p:sp>
+        <p:nvSpPr>
+          <p:cNvPr id="2" name="Slide Image Placeholder 1">
+            <a:extLst>
+              <a:ext uri="{FF2B5EF4-FFF2-40B4-BE49-F238E27FC236}">
+                <a16:creationId xmlns:a16="http://schemas.microsoft.com/office/drawing/2014/main" id="{B2B8724D-2102-4BE5-D833-FA5F0B08F664}"/>
+              </a:ext>
+            </a:extLst>
+          </p:cNvPr>
+          <p:cNvSpPr>
+            <a:spLocks noGrp="1" noRot="1" noChangeAspect="1"/>
+          </p:cNvSpPr>
+          <p:nvPr>
+            <p:ph type="sldImg"/>
+          </p:nvPr>
+        </p:nvSpPr>
+        <p:spPr>
+          <a:xfrm>
+            <a:off x="381000" y="685800"/>
+            <a:ext cx="6096000" cy="3429000"/>
+          </a:xfrm>
+        </p:spPr>
+      </p:sp>
+      <p:sp>
+        <p:nvSpPr>
+          <p:cNvPr id="3" name="Notes Placeholder 2">
+            <a:extLst>
+              <a:ext uri="{FF2B5EF4-FFF2-40B4-BE49-F238E27FC236}">
+                <a16:creationId xmlns:a16="http://schemas.microsoft.com/office/drawing/2014/main" id="{449907D1-3CAF-DC4A-22A4-8B7D4BD3B56C}"/>
+              </a:ext>
+            </a:extLst>
+          </p:cNvPr>
+          <p:cNvSpPr>
+            <a:spLocks noGrp="1"/>
+          </p:cNvSpPr>
+          <p:nvPr>
+            <p:ph type="body" idx="1"/>
+          </p:nvPr>
+        </p:nvSpPr>
+        <p:spPr/>
+        <p:txBody>
+          <a:bodyPr/>
+          <a:lstStyle/>
+          <a:p>
+            <a:endParaRPr lang="en-US" dirty="0"/>
+          </a:p>
+        </p:txBody>
+      </p:sp>
+      <p:sp>
+        <p:nvSpPr>
+          <p:cNvPr id="4" name="Slide Number Placeholder 3">
+            <a:extLst>
+              <a:ext uri="{FF2B5EF4-FFF2-40B4-BE49-F238E27FC236}">
+                <a16:creationId xmlns:a16="http://schemas.microsoft.com/office/drawing/2014/main" id="{8E30BFAC-23C0-D50A-5C8A-BC3144F04545}"/>
+              </a:ext>
+            </a:extLst>
+          </p:cNvPr>
+          <p:cNvSpPr>
+            <a:spLocks noGrp="1"/>
+          </p:cNvSpPr>
+          <p:nvPr>
+            <p:ph type="sldNum" sz="quarter" idx="10"/>
+          </p:nvPr>
+        </p:nvSpPr>
+        <p:spPr/>
+        <p:txBody>
+          <a:bodyPr/>
+          <a:lstStyle/>
+          <a:p>
+            <a:fld id="{DEC8F7F9-57EC-49CF-9FCD-2B781E4B449F}" type="slidenum">
+              <a:rPr lang="en-US" smtClean="0"/>
+              <a:t>14</a:t>
+            </a:fld>
+            <a:endParaRPr lang="en-US"/>
+          </a:p>
+        </p:txBody>
+      </p:sp>
+    </p:spTree>
+    <p:extLst>
+      <p:ext uri="{BB962C8B-B14F-4D97-AF65-F5344CB8AC3E}">
+        <p14:creationId xmlns:p14="http://schemas.microsoft.com/office/powerpoint/2010/main" val="949293986"/>
+      </p:ext>
+    </p:extLst>
+  </p:cSld>
+  <p:clrMapOvr>
+    <a:masterClrMapping/>
+  </p:clrMapOvr>
+</p:notes>
+</file>
+
+<file path=ppt/notesSlides/notesSlide15.xml><?xml version="1.0" encoding="utf-8"?>
+<p:notes xmlns:a="http://schemas.openxmlformats.org/drawingml/2006/main" xmlns:r="http://schemas.openxmlformats.org/officeDocument/2006/relationships" xmlns:p="http://schemas.openxmlformats.org/presentationml/2006/main">
+  <p:cSld>
+    <p:spTree>
+      <p:nvGrpSpPr>
         <p:cNvPr id="1" name=""/>
         <p:cNvGrpSpPr/>
         <p:nvPr/>
@@ -1091,7 +1551,7 @@
           <a:p>
             <a:fld id="{DEC8F7F9-57EC-49CF-9FCD-2B781E4B449F}" type="slidenum">
               <a:rPr lang="en-US" smtClean="0"/>
-              <a:t>11</a:t>
+              <a:t>15</a:t>
             </a:fld>
             <a:endParaRPr lang="en-US"/>
           </a:p>
@@ -1101,6 +1561,186 @@
     <p:extLst>
       <p:ext uri="{BB962C8B-B14F-4D97-AF65-F5344CB8AC3E}">
         <p14:creationId xmlns:p14="http://schemas.microsoft.com/office/powerpoint/2010/main" val="1128756061"/>
+      </p:ext>
+    </p:extLst>
+  </p:cSld>
+  <p:clrMapOvr>
+    <a:masterClrMapping/>
+  </p:clrMapOvr>
+</p:notes>
+</file>
+
+<file path=ppt/notesSlides/notesSlide16.xml><?xml version="1.0" encoding="utf-8"?>
+<p:notes xmlns:a="http://schemas.openxmlformats.org/drawingml/2006/main" xmlns:r="http://schemas.openxmlformats.org/officeDocument/2006/relationships" xmlns:p="http://schemas.openxmlformats.org/presentationml/2006/main">
+  <p:cSld>
+    <p:spTree>
+      <p:nvGrpSpPr>
+        <p:cNvPr id="1" name="">
+          <a:extLst>
+            <a:ext uri="{FF2B5EF4-FFF2-40B4-BE49-F238E27FC236}">
+              <a16:creationId xmlns:a16="http://schemas.microsoft.com/office/drawing/2014/main" id="{6F0C319B-CD0F-5014-8F75-C6707D861B62}"/>
+            </a:ext>
+          </a:extLst>
+        </p:cNvPr>
+        <p:cNvGrpSpPr/>
+        <p:nvPr/>
+      </p:nvGrpSpPr>
+      <p:grpSpPr>
+        <a:xfrm>
+          <a:off x="0" y="0"/>
+          <a:ext cx="0" cy="0"/>
+          <a:chOff x="0" y="0"/>
+          <a:chExt cx="0" cy="0"/>
+        </a:xfrm>
+      </p:grpSpPr>
+      <p:sp>
+        <p:nvSpPr>
+          <p:cNvPr id="2" name="Slide Image Placeholder 1">
+            <a:extLst>
+              <a:ext uri="{FF2B5EF4-FFF2-40B4-BE49-F238E27FC236}">
+                <a16:creationId xmlns:a16="http://schemas.microsoft.com/office/drawing/2014/main" id="{6A49B13A-911B-D771-2ECD-C49D0270EE64}"/>
+              </a:ext>
+            </a:extLst>
+          </p:cNvPr>
+          <p:cNvSpPr>
+            <a:spLocks noGrp="1" noRot="1" noChangeAspect="1"/>
+          </p:cNvSpPr>
+          <p:nvPr>
+            <p:ph type="sldImg"/>
+          </p:nvPr>
+        </p:nvSpPr>
+        <p:spPr>
+          <a:xfrm>
+            <a:off x="381000" y="685800"/>
+            <a:ext cx="6096000" cy="3429000"/>
+          </a:xfrm>
+        </p:spPr>
+      </p:sp>
+      <p:sp>
+        <p:nvSpPr>
+          <p:cNvPr id="3" name="Notes Placeholder 2">
+            <a:extLst>
+              <a:ext uri="{FF2B5EF4-FFF2-40B4-BE49-F238E27FC236}">
+                <a16:creationId xmlns:a16="http://schemas.microsoft.com/office/drawing/2014/main" id="{B572CEF9-0B3C-164B-DBE7-5169320ACD15}"/>
+              </a:ext>
+            </a:extLst>
+          </p:cNvPr>
+          <p:cNvSpPr>
+            <a:spLocks noGrp="1"/>
+          </p:cNvSpPr>
+          <p:nvPr>
+            <p:ph type="body" idx="1"/>
+          </p:nvPr>
+        </p:nvSpPr>
+        <p:spPr/>
+        <p:txBody>
+          <a:bodyPr/>
+          <a:lstStyle/>
+          <a:p>
+            <a:r>
+              <a:rPr lang="en-US" dirty="0"/>
+              <a:t>This is an entire HTML document:</a:t>
+            </a:r>
+          </a:p>
+          <a:p>
+            <a:endParaRPr lang="en-US" dirty="0"/>
+          </a:p>
+          <a:p>
+            <a:pPr marL="171450" indent="-171450">
+              <a:buFontTx/>
+              <a:buChar char="-"/>
+            </a:pPr>
+            <a:r>
+              <a:rPr lang="en-US" baseline="0" dirty="0"/>
+              <a:t>HTML element</a:t>
+            </a:r>
+          </a:p>
+          <a:p>
+            <a:pPr marL="171450" indent="-171450">
+              <a:buFontTx/>
+              <a:buChar char="-"/>
+            </a:pPr>
+            <a:r>
+              <a:rPr lang="en-US" baseline="0" dirty="0"/>
+              <a:t>Body element</a:t>
+            </a:r>
+          </a:p>
+          <a:p>
+            <a:pPr marL="171450" indent="-171450">
+              <a:buFontTx/>
+              <a:buChar char="-"/>
+            </a:pPr>
+            <a:r>
+              <a:rPr lang="en-US" baseline="0" dirty="0"/>
+              <a:t>Header element</a:t>
+            </a:r>
+          </a:p>
+          <a:p>
+            <a:pPr marL="171450" indent="-171450">
+              <a:buFontTx/>
+              <a:buChar char="-"/>
+            </a:pPr>
+            <a:r>
+              <a:rPr lang="en-US" baseline="0" dirty="0"/>
+              <a:t>Paragraph element</a:t>
+            </a:r>
+          </a:p>
+          <a:p>
+            <a:pPr marL="171450" indent="-171450">
+              <a:buFontTx/>
+              <a:buChar char="-"/>
+            </a:pPr>
+            <a:r>
+              <a:rPr lang="en-US" baseline="0" dirty="0"/>
+              <a:t>Anchor element</a:t>
+            </a:r>
+          </a:p>
+          <a:p>
+            <a:pPr marL="171450" indent="-171450">
+              <a:buFontTx/>
+              <a:buChar char="-"/>
+            </a:pPr>
+            <a:r>
+              <a:rPr lang="en-US" baseline="0" dirty="0"/>
+              <a:t>Image element</a:t>
+            </a:r>
+            <a:endParaRPr lang="en-US" dirty="0"/>
+          </a:p>
+        </p:txBody>
+      </p:sp>
+      <p:sp>
+        <p:nvSpPr>
+          <p:cNvPr id="4" name="Slide Number Placeholder 3">
+            <a:extLst>
+              <a:ext uri="{FF2B5EF4-FFF2-40B4-BE49-F238E27FC236}">
+                <a16:creationId xmlns:a16="http://schemas.microsoft.com/office/drawing/2014/main" id="{D679F993-DE2F-5A56-9CE8-096916C63A0D}"/>
+              </a:ext>
+            </a:extLst>
+          </p:cNvPr>
+          <p:cNvSpPr>
+            <a:spLocks noGrp="1"/>
+          </p:cNvSpPr>
+          <p:nvPr>
+            <p:ph type="sldNum" sz="quarter" idx="10"/>
+          </p:nvPr>
+        </p:nvSpPr>
+        <p:spPr/>
+        <p:txBody>
+          <a:bodyPr/>
+          <a:lstStyle/>
+          <a:p>
+            <a:fld id="{DEC8F7F9-57EC-49CF-9FCD-2B781E4B449F}" type="slidenum">
+              <a:rPr lang="en-US" smtClean="0"/>
+              <a:t>16</a:t>
+            </a:fld>
+            <a:endParaRPr lang="en-US"/>
+          </a:p>
+        </p:txBody>
+      </p:sp>
+    </p:spTree>
+    <p:extLst>
+      <p:ext uri="{BB962C8B-B14F-4D97-AF65-F5344CB8AC3E}">
+        <p14:creationId xmlns:p14="http://schemas.microsoft.com/office/powerpoint/2010/main" val="31505322"/>
       </p:ext>
     </p:extLst>
   </p:cSld>
@@ -6445,6 +7085,766 @@
   <p:cSld>
     <p:spTree>
       <p:nvGrpSpPr>
+        <p:cNvPr id="1" name="">
+          <a:extLst>
+            <a:ext uri="{FF2B5EF4-FFF2-40B4-BE49-F238E27FC236}">
+              <a16:creationId xmlns:a16="http://schemas.microsoft.com/office/drawing/2014/main" id="{FE8DA4B8-47EC-563D-68F5-5E29521DD558}"/>
+            </a:ext>
+          </a:extLst>
+        </p:cNvPr>
+        <p:cNvGrpSpPr/>
+        <p:nvPr/>
+      </p:nvGrpSpPr>
+      <p:grpSpPr>
+        <a:xfrm>
+          <a:off x="0" y="0"/>
+          <a:ext cx="0" cy="0"/>
+          <a:chOff x="0" y="0"/>
+          <a:chExt cx="0" cy="0"/>
+        </a:xfrm>
+      </p:grpSpPr>
+      <p:sp>
+        <p:nvSpPr>
+          <p:cNvPr id="2" name="Title 1">
+            <a:extLst>
+              <a:ext uri="{FF2B5EF4-FFF2-40B4-BE49-F238E27FC236}">
+                <a16:creationId xmlns:a16="http://schemas.microsoft.com/office/drawing/2014/main" id="{419C3341-ABAA-AAFD-CDEB-F0A9DD7A8250}"/>
+              </a:ext>
+            </a:extLst>
+          </p:cNvPr>
+          <p:cNvSpPr>
+            <a:spLocks noGrp="1"/>
+          </p:cNvSpPr>
+          <p:nvPr>
+            <p:ph type="title"/>
+          </p:nvPr>
+        </p:nvSpPr>
+        <p:spPr/>
+        <p:txBody>
+          <a:bodyPr/>
+          <a:lstStyle/>
+          <a:p>
+            <a:r>
+              <a:rPr lang="en-US" dirty="0"/>
+              <a:t>10</a:t>
+            </a:r>
+          </a:p>
+        </p:txBody>
+      </p:sp>
+      <p:sp>
+        <p:nvSpPr>
+          <p:cNvPr id="3" name="Content Placeholder 2">
+            <a:extLst>
+              <a:ext uri="{FF2B5EF4-FFF2-40B4-BE49-F238E27FC236}">
+                <a16:creationId xmlns:a16="http://schemas.microsoft.com/office/drawing/2014/main" id="{15EEB02A-FF08-CD4E-1A87-B8D1385E5539}"/>
+              </a:ext>
+            </a:extLst>
+          </p:cNvPr>
+          <p:cNvSpPr>
+            <a:spLocks noGrp="1"/>
+          </p:cNvSpPr>
+          <p:nvPr>
+            <p:ph idx="4294967295"/>
+          </p:nvPr>
+        </p:nvSpPr>
+        <p:spPr>
+          <a:xfrm>
+            <a:off x="796635" y="1152525"/>
+            <a:ext cx="7703999" cy="3416300"/>
+          </a:xfrm>
+        </p:spPr>
+        <p:txBody>
+          <a:bodyPr anchor="ctr"/>
+          <a:lstStyle/>
+          <a:p>
+            <a:pPr marL="42863" indent="0" algn="ctr">
+              <a:buNone/>
+            </a:pPr>
+            <a:r>
+              <a:rPr lang="pt-BR" sz="4800" dirty="0">
+                <a:solidFill>
+                  <a:srgbClr val="800000"/>
+                </a:solidFill>
+                <a:latin typeface="Consolas" panose="020B0609020204030204" pitchFamily="49" charset="0"/>
+              </a:rPr>
+              <a:t>&lt;input </a:t>
+            </a:r>
+            <a:r>
+              <a:rPr lang="pt-BR" sz="4800" dirty="0">
+                <a:solidFill>
+                  <a:srgbClr val="FF0000"/>
+                </a:solidFill>
+                <a:latin typeface="Consolas" panose="020B0609020204030204" pitchFamily="49" charset="0"/>
+              </a:rPr>
+              <a:t>type</a:t>
+            </a:r>
+            <a:r>
+              <a:rPr lang="pt-BR" sz="4800" dirty="0">
+                <a:solidFill>
+                  <a:schemeClr val="tx1"/>
+                </a:solidFill>
+                <a:latin typeface="Consolas" panose="020B0609020204030204" pitchFamily="49" charset="0"/>
+              </a:rPr>
+              <a:t>=</a:t>
+            </a:r>
+            <a:r>
+              <a:rPr lang="pt-BR" sz="4800" dirty="0">
+                <a:solidFill>
+                  <a:srgbClr val="0000FF"/>
+                </a:solidFill>
+                <a:latin typeface="Consolas" panose="020B0609020204030204" pitchFamily="49" charset="0"/>
+              </a:rPr>
+              <a:t>"text"</a:t>
+            </a:r>
+            <a:r>
+              <a:rPr lang="pt-BR" sz="4800" dirty="0">
+                <a:solidFill>
+                  <a:srgbClr val="800000"/>
+                </a:solidFill>
+                <a:latin typeface="Consolas" panose="020B0609020204030204" pitchFamily="49" charset="0"/>
+              </a:rPr>
+              <a:t>&gt;</a:t>
+            </a:r>
+            <a:endParaRPr lang="pt-BR" sz="4800" dirty="0">
+              <a:solidFill>
+                <a:srgbClr val="000000"/>
+              </a:solidFill>
+              <a:latin typeface="Consolas" panose="020B0609020204030204" pitchFamily="49" charset="0"/>
+            </a:endParaRPr>
+          </a:p>
+        </p:txBody>
+      </p:sp>
+    </p:spTree>
+    <p:extLst>
+      <p:ext uri="{BB962C8B-B14F-4D97-AF65-F5344CB8AC3E}">
+        <p14:creationId xmlns:p14="http://schemas.microsoft.com/office/powerpoint/2010/main" val="1642577485"/>
+      </p:ext>
+    </p:extLst>
+  </p:cSld>
+  <p:clrMapOvr>
+    <a:masterClrMapping/>
+  </p:clrMapOvr>
+</p:sld>
+</file>
+
+<file path=ppt/slides/slide12.xml><?xml version="1.0" encoding="utf-8"?>
+<p:sld xmlns:a="http://schemas.openxmlformats.org/drawingml/2006/main" xmlns:r="http://schemas.openxmlformats.org/officeDocument/2006/relationships" xmlns:p="http://schemas.openxmlformats.org/presentationml/2006/main">
+  <p:cSld>
+    <p:spTree>
+      <p:nvGrpSpPr>
+        <p:cNvPr id="1" name="">
+          <a:extLst>
+            <a:ext uri="{FF2B5EF4-FFF2-40B4-BE49-F238E27FC236}">
+              <a16:creationId xmlns:a16="http://schemas.microsoft.com/office/drawing/2014/main" id="{C06CB055-126B-7E36-76F8-D3A3A429FFEF}"/>
+            </a:ext>
+          </a:extLst>
+        </p:cNvPr>
+        <p:cNvGrpSpPr/>
+        <p:nvPr/>
+      </p:nvGrpSpPr>
+      <p:grpSpPr>
+        <a:xfrm>
+          <a:off x="0" y="0"/>
+          <a:ext cx="0" cy="0"/>
+          <a:chOff x="0" y="0"/>
+          <a:chExt cx="0" cy="0"/>
+        </a:xfrm>
+      </p:grpSpPr>
+      <p:sp>
+        <p:nvSpPr>
+          <p:cNvPr id="2" name="Title 1">
+            <a:extLst>
+              <a:ext uri="{FF2B5EF4-FFF2-40B4-BE49-F238E27FC236}">
+                <a16:creationId xmlns:a16="http://schemas.microsoft.com/office/drawing/2014/main" id="{3D118691-1BFE-4996-31B2-AEF37F5C77DC}"/>
+              </a:ext>
+            </a:extLst>
+          </p:cNvPr>
+          <p:cNvSpPr>
+            <a:spLocks noGrp="1"/>
+          </p:cNvSpPr>
+          <p:nvPr>
+            <p:ph type="title"/>
+          </p:nvPr>
+        </p:nvSpPr>
+        <p:spPr/>
+        <p:txBody>
+          <a:bodyPr/>
+          <a:lstStyle/>
+          <a:p>
+            <a:r>
+              <a:rPr lang="en-US" dirty="0"/>
+              <a:t>11</a:t>
+            </a:r>
+          </a:p>
+        </p:txBody>
+      </p:sp>
+      <p:sp>
+        <p:nvSpPr>
+          <p:cNvPr id="3" name="Content Placeholder 2">
+            <a:extLst>
+              <a:ext uri="{FF2B5EF4-FFF2-40B4-BE49-F238E27FC236}">
+                <a16:creationId xmlns:a16="http://schemas.microsoft.com/office/drawing/2014/main" id="{DCC0A058-5ADD-4C8B-2E97-04F1B2EB3BC1}"/>
+              </a:ext>
+            </a:extLst>
+          </p:cNvPr>
+          <p:cNvSpPr>
+            <a:spLocks noGrp="1"/>
+          </p:cNvSpPr>
+          <p:nvPr>
+            <p:ph idx="4294967295"/>
+          </p:nvPr>
+        </p:nvSpPr>
+        <p:spPr>
+          <a:xfrm>
+            <a:off x="796635" y="1152525"/>
+            <a:ext cx="7703999" cy="3416300"/>
+          </a:xfrm>
+        </p:spPr>
+        <p:txBody>
+          <a:bodyPr anchor="ctr"/>
+          <a:lstStyle/>
+          <a:p>
+            <a:pPr marL="42863" indent="0" algn="ctr">
+              <a:buNone/>
+            </a:pPr>
+            <a:r>
+              <a:rPr lang="pt-BR" sz="4800" dirty="0">
+                <a:solidFill>
+                  <a:srgbClr val="800000"/>
+                </a:solidFill>
+                <a:latin typeface="Consolas" panose="020B0609020204030204" pitchFamily="49" charset="0"/>
+              </a:rPr>
+              <a:t>&lt;input </a:t>
+            </a:r>
+            <a:r>
+              <a:rPr lang="pt-BR" sz="4800" dirty="0">
+                <a:solidFill>
+                  <a:srgbClr val="FF0000"/>
+                </a:solidFill>
+                <a:latin typeface="Consolas" panose="020B0609020204030204" pitchFamily="49" charset="0"/>
+              </a:rPr>
+              <a:t>type</a:t>
+            </a:r>
+            <a:r>
+              <a:rPr lang="pt-BR" sz="4800" dirty="0">
+                <a:solidFill>
+                  <a:schemeClr val="tx1"/>
+                </a:solidFill>
+                <a:latin typeface="Consolas" panose="020B0609020204030204" pitchFamily="49" charset="0"/>
+              </a:rPr>
+              <a:t>=</a:t>
+            </a:r>
+            <a:r>
+              <a:rPr lang="pt-BR" sz="4800" dirty="0">
+                <a:solidFill>
+                  <a:srgbClr val="0000FF"/>
+                </a:solidFill>
+                <a:latin typeface="Consolas" panose="020B0609020204030204" pitchFamily="49" charset="0"/>
+              </a:rPr>
+              <a:t>"range"</a:t>
+            </a:r>
+            <a:r>
+              <a:rPr lang="pt-BR" sz="4800" dirty="0">
+                <a:solidFill>
+                  <a:srgbClr val="800000"/>
+                </a:solidFill>
+                <a:latin typeface="Consolas" panose="020B0609020204030204" pitchFamily="49" charset="0"/>
+              </a:rPr>
+              <a:t>&gt;</a:t>
+            </a:r>
+            <a:endParaRPr lang="pt-BR" sz="4800" dirty="0">
+              <a:solidFill>
+                <a:srgbClr val="000000"/>
+              </a:solidFill>
+              <a:latin typeface="Consolas" panose="020B0609020204030204" pitchFamily="49" charset="0"/>
+            </a:endParaRPr>
+          </a:p>
+        </p:txBody>
+      </p:sp>
+    </p:spTree>
+    <p:extLst>
+      <p:ext uri="{BB962C8B-B14F-4D97-AF65-F5344CB8AC3E}">
+        <p14:creationId xmlns:p14="http://schemas.microsoft.com/office/powerpoint/2010/main" val="3388806985"/>
+      </p:ext>
+    </p:extLst>
+  </p:cSld>
+  <p:clrMapOvr>
+    <a:masterClrMapping/>
+  </p:clrMapOvr>
+</p:sld>
+</file>
+
+<file path=ppt/slides/slide13.xml><?xml version="1.0" encoding="utf-8"?>
+<p:sld xmlns:a="http://schemas.openxmlformats.org/drawingml/2006/main" xmlns:r="http://schemas.openxmlformats.org/officeDocument/2006/relationships" xmlns:p="http://schemas.openxmlformats.org/presentationml/2006/main">
+  <p:cSld>
+    <p:spTree>
+      <p:nvGrpSpPr>
+        <p:cNvPr id="1" name="">
+          <a:extLst>
+            <a:ext uri="{FF2B5EF4-FFF2-40B4-BE49-F238E27FC236}">
+              <a16:creationId xmlns:a16="http://schemas.microsoft.com/office/drawing/2014/main" id="{D387AB91-A208-6F44-0DDD-91B3C12CDF9B}"/>
+            </a:ext>
+          </a:extLst>
+        </p:cNvPr>
+        <p:cNvGrpSpPr/>
+        <p:nvPr/>
+      </p:nvGrpSpPr>
+      <p:grpSpPr>
+        <a:xfrm>
+          <a:off x="0" y="0"/>
+          <a:ext cx="0" cy="0"/>
+          <a:chOff x="0" y="0"/>
+          <a:chExt cx="0" cy="0"/>
+        </a:xfrm>
+      </p:grpSpPr>
+      <p:sp>
+        <p:nvSpPr>
+          <p:cNvPr id="2" name="Title 1">
+            <a:extLst>
+              <a:ext uri="{FF2B5EF4-FFF2-40B4-BE49-F238E27FC236}">
+                <a16:creationId xmlns:a16="http://schemas.microsoft.com/office/drawing/2014/main" id="{4BBC0D8A-2C5F-FF14-404C-8040EFA1C667}"/>
+              </a:ext>
+            </a:extLst>
+          </p:cNvPr>
+          <p:cNvSpPr>
+            <a:spLocks noGrp="1"/>
+          </p:cNvSpPr>
+          <p:nvPr>
+            <p:ph type="title"/>
+          </p:nvPr>
+        </p:nvSpPr>
+        <p:spPr/>
+        <p:txBody>
+          <a:bodyPr/>
+          <a:lstStyle/>
+          <a:p>
+            <a:r>
+              <a:rPr lang="en-US" dirty="0"/>
+              <a:t>12</a:t>
+            </a:r>
+          </a:p>
+        </p:txBody>
+      </p:sp>
+      <p:sp>
+        <p:nvSpPr>
+          <p:cNvPr id="3" name="Content Placeholder 2">
+            <a:extLst>
+              <a:ext uri="{FF2B5EF4-FFF2-40B4-BE49-F238E27FC236}">
+                <a16:creationId xmlns:a16="http://schemas.microsoft.com/office/drawing/2014/main" id="{2AD2B11A-D64E-9FF5-7894-0FE8830196D8}"/>
+              </a:ext>
+            </a:extLst>
+          </p:cNvPr>
+          <p:cNvSpPr>
+            <a:spLocks noGrp="1"/>
+          </p:cNvSpPr>
+          <p:nvPr>
+            <p:ph idx="4294967295"/>
+          </p:nvPr>
+        </p:nvSpPr>
+        <p:spPr>
+          <a:xfrm>
+            <a:off x="796635" y="1152525"/>
+            <a:ext cx="7703999" cy="3416300"/>
+          </a:xfrm>
+        </p:spPr>
+        <p:txBody>
+          <a:bodyPr anchor="ctr"/>
+          <a:lstStyle/>
+          <a:p>
+            <a:pPr marL="42863" indent="0">
+              <a:buNone/>
+            </a:pPr>
+            <a:r>
+              <a:rPr lang="pt-BR" sz="4000" dirty="0">
+                <a:solidFill>
+                  <a:srgbClr val="800000"/>
+                </a:solidFill>
+                <a:latin typeface="Consolas" panose="020B0609020204030204" pitchFamily="49" charset="0"/>
+              </a:rPr>
+              <a:t>&lt;ul&gt;</a:t>
+            </a:r>
+          </a:p>
+          <a:p>
+            <a:pPr marL="42863" indent="0">
+              <a:buNone/>
+            </a:pPr>
+            <a:r>
+              <a:rPr lang="pt-BR" sz="4000" dirty="0">
+                <a:solidFill>
+                  <a:srgbClr val="800000"/>
+                </a:solidFill>
+                <a:latin typeface="Consolas" panose="020B0609020204030204" pitchFamily="49" charset="0"/>
+              </a:rPr>
+              <a:t>	&lt;li&gt;</a:t>
+            </a:r>
+            <a:r>
+              <a:rPr lang="pt-BR" sz="4000" dirty="0">
+                <a:solidFill>
+                  <a:schemeClr val="tx1"/>
+                </a:solidFill>
+                <a:latin typeface="Consolas" panose="020B0609020204030204" pitchFamily="49" charset="0"/>
+              </a:rPr>
+              <a:t>Sugar</a:t>
+            </a:r>
+            <a:r>
+              <a:rPr lang="pt-BR" sz="4000" dirty="0">
+                <a:solidFill>
+                  <a:srgbClr val="800000"/>
+                </a:solidFill>
+                <a:latin typeface="Consolas" panose="020B0609020204030204" pitchFamily="49" charset="0"/>
+              </a:rPr>
+              <a:t>&lt;/li&gt;</a:t>
+            </a:r>
+            <a:endParaRPr lang="pt-BR" sz="4000" dirty="0">
+              <a:solidFill>
+                <a:srgbClr val="000000"/>
+              </a:solidFill>
+              <a:latin typeface="Consolas" panose="020B0609020204030204" pitchFamily="49" charset="0"/>
+            </a:endParaRPr>
+          </a:p>
+          <a:p>
+            <a:pPr marL="42863" indent="0">
+              <a:buNone/>
+            </a:pPr>
+            <a:r>
+              <a:rPr lang="pt-BR" sz="4000" dirty="0">
+                <a:solidFill>
+                  <a:srgbClr val="800000"/>
+                </a:solidFill>
+                <a:latin typeface="Consolas" panose="020B0609020204030204" pitchFamily="49" charset="0"/>
+              </a:rPr>
+              <a:t>	&lt;li&gt;</a:t>
+            </a:r>
+            <a:r>
+              <a:rPr lang="pt-BR" sz="4000" dirty="0">
+                <a:solidFill>
+                  <a:schemeClr val="tx1"/>
+                </a:solidFill>
+                <a:latin typeface="Consolas" panose="020B0609020204030204" pitchFamily="49" charset="0"/>
+              </a:rPr>
+              <a:t>Milk</a:t>
+            </a:r>
+            <a:r>
+              <a:rPr lang="pt-BR" sz="4000" dirty="0">
+                <a:solidFill>
+                  <a:srgbClr val="800000"/>
+                </a:solidFill>
+                <a:latin typeface="Consolas" panose="020B0609020204030204" pitchFamily="49" charset="0"/>
+              </a:rPr>
+              <a:t>&lt;/li&gt;</a:t>
+            </a:r>
+            <a:endParaRPr lang="pt-BR" sz="4000" dirty="0">
+              <a:solidFill>
+                <a:srgbClr val="000000"/>
+              </a:solidFill>
+              <a:latin typeface="Consolas" panose="020B0609020204030204" pitchFamily="49" charset="0"/>
+            </a:endParaRPr>
+          </a:p>
+          <a:p>
+            <a:pPr marL="42863" indent="0">
+              <a:buNone/>
+            </a:pPr>
+            <a:r>
+              <a:rPr lang="pt-BR" sz="4000" dirty="0">
+                <a:solidFill>
+                  <a:srgbClr val="800000"/>
+                </a:solidFill>
+                <a:latin typeface="Consolas" panose="020B0609020204030204" pitchFamily="49" charset="0"/>
+              </a:rPr>
+              <a:t>	&lt;li&gt;</a:t>
+            </a:r>
+            <a:r>
+              <a:rPr lang="pt-BR" sz="4000" dirty="0">
+                <a:solidFill>
+                  <a:schemeClr val="tx1"/>
+                </a:solidFill>
+                <a:latin typeface="Consolas" panose="020B0609020204030204" pitchFamily="49" charset="0"/>
+              </a:rPr>
+              <a:t>Eggs</a:t>
+            </a:r>
+            <a:r>
+              <a:rPr lang="pt-BR" sz="4000" dirty="0">
+                <a:solidFill>
+                  <a:srgbClr val="800000"/>
+                </a:solidFill>
+                <a:latin typeface="Consolas" panose="020B0609020204030204" pitchFamily="49" charset="0"/>
+              </a:rPr>
+              <a:t>&lt;/li&gt;</a:t>
+            </a:r>
+          </a:p>
+          <a:p>
+            <a:pPr marL="42863" indent="0">
+              <a:buNone/>
+            </a:pPr>
+            <a:r>
+              <a:rPr lang="pt-BR" sz="4000" dirty="0">
+                <a:solidFill>
+                  <a:srgbClr val="800000"/>
+                </a:solidFill>
+                <a:latin typeface="Consolas" panose="020B0609020204030204" pitchFamily="49" charset="0"/>
+              </a:rPr>
+              <a:t>&lt;/ul&gt;</a:t>
+            </a:r>
+            <a:endParaRPr lang="pt-BR" sz="4000" dirty="0">
+              <a:solidFill>
+                <a:srgbClr val="000000"/>
+              </a:solidFill>
+              <a:latin typeface="Consolas" panose="020B0609020204030204" pitchFamily="49" charset="0"/>
+            </a:endParaRPr>
+          </a:p>
+        </p:txBody>
+      </p:sp>
+    </p:spTree>
+    <p:extLst>
+      <p:ext uri="{BB962C8B-B14F-4D97-AF65-F5344CB8AC3E}">
+        <p14:creationId xmlns:p14="http://schemas.microsoft.com/office/powerpoint/2010/main" val="2993462112"/>
+      </p:ext>
+    </p:extLst>
+  </p:cSld>
+  <p:clrMapOvr>
+    <a:masterClrMapping/>
+  </p:clrMapOvr>
+</p:sld>
+</file>
+
+<file path=ppt/slides/slide14.xml><?xml version="1.0" encoding="utf-8"?>
+<p:sld xmlns:a="http://schemas.openxmlformats.org/drawingml/2006/main" xmlns:r="http://schemas.openxmlformats.org/officeDocument/2006/relationships" xmlns:p="http://schemas.openxmlformats.org/presentationml/2006/main">
+  <p:cSld>
+    <p:spTree>
+      <p:nvGrpSpPr>
+        <p:cNvPr id="1" name="">
+          <a:extLst>
+            <a:ext uri="{FF2B5EF4-FFF2-40B4-BE49-F238E27FC236}">
+              <a16:creationId xmlns:a16="http://schemas.microsoft.com/office/drawing/2014/main" id="{30C7B8AB-855F-BA39-4512-3E9D03FF5E8B}"/>
+            </a:ext>
+          </a:extLst>
+        </p:cNvPr>
+        <p:cNvGrpSpPr/>
+        <p:nvPr/>
+      </p:nvGrpSpPr>
+      <p:grpSpPr>
+        <a:xfrm>
+          <a:off x="0" y="0"/>
+          <a:ext cx="0" cy="0"/>
+          <a:chOff x="0" y="0"/>
+          <a:chExt cx="0" cy="0"/>
+        </a:xfrm>
+      </p:grpSpPr>
+      <p:sp>
+        <p:nvSpPr>
+          <p:cNvPr id="2" name="Title 1">
+            <a:extLst>
+              <a:ext uri="{FF2B5EF4-FFF2-40B4-BE49-F238E27FC236}">
+                <a16:creationId xmlns:a16="http://schemas.microsoft.com/office/drawing/2014/main" id="{DC7810D8-FF3E-DF3F-1437-31BD26E65D94}"/>
+              </a:ext>
+            </a:extLst>
+          </p:cNvPr>
+          <p:cNvSpPr>
+            <a:spLocks noGrp="1"/>
+          </p:cNvSpPr>
+          <p:nvPr>
+            <p:ph type="title"/>
+          </p:nvPr>
+        </p:nvSpPr>
+        <p:spPr/>
+        <p:txBody>
+          <a:bodyPr/>
+          <a:lstStyle/>
+          <a:p>
+            <a:r>
+              <a:rPr lang="en-US" dirty="0"/>
+              <a:t>13</a:t>
+            </a:r>
+          </a:p>
+        </p:txBody>
+      </p:sp>
+      <p:sp>
+        <p:nvSpPr>
+          <p:cNvPr id="3" name="Content Placeholder 2">
+            <a:extLst>
+              <a:ext uri="{FF2B5EF4-FFF2-40B4-BE49-F238E27FC236}">
+                <a16:creationId xmlns:a16="http://schemas.microsoft.com/office/drawing/2014/main" id="{15F92286-9647-744A-9754-850B508AD385}"/>
+              </a:ext>
+            </a:extLst>
+          </p:cNvPr>
+          <p:cNvSpPr>
+            <a:spLocks noGrp="1"/>
+          </p:cNvSpPr>
+          <p:nvPr>
+            <p:ph idx="4294967295"/>
+          </p:nvPr>
+        </p:nvSpPr>
+        <p:spPr>
+          <a:xfrm>
+            <a:off x="796635" y="1152525"/>
+            <a:ext cx="7703999" cy="3416300"/>
+          </a:xfrm>
+        </p:spPr>
+        <p:txBody>
+          <a:bodyPr anchor="ctr"/>
+          <a:lstStyle/>
+          <a:p>
+            <a:pPr marL="42863" indent="0">
+              <a:buNone/>
+            </a:pPr>
+            <a:r>
+              <a:rPr lang="pt-BR" sz="3200" dirty="0">
+                <a:solidFill>
+                  <a:srgbClr val="800000"/>
+                </a:solidFill>
+                <a:latin typeface="Consolas" panose="020B0609020204030204" pitchFamily="49" charset="0"/>
+              </a:rPr>
+              <a:t>&lt;ol&gt;</a:t>
+            </a:r>
+          </a:p>
+          <a:p>
+            <a:pPr marL="42863" indent="0">
+              <a:buNone/>
+            </a:pPr>
+            <a:r>
+              <a:rPr lang="pt-BR" sz="3200" dirty="0">
+                <a:solidFill>
+                  <a:srgbClr val="800000"/>
+                </a:solidFill>
+                <a:latin typeface="Consolas" panose="020B0609020204030204" pitchFamily="49" charset="0"/>
+              </a:rPr>
+              <a:t>	&lt;li&gt;</a:t>
+            </a:r>
+            <a:r>
+              <a:rPr lang="pt-BR" sz="3200" dirty="0">
+                <a:solidFill>
+                  <a:schemeClr val="tx1"/>
+                </a:solidFill>
+                <a:latin typeface="Consolas" panose="020B0609020204030204" pitchFamily="49" charset="0"/>
+              </a:rPr>
+              <a:t>Combine Milk &amp; Sugar</a:t>
+            </a:r>
+            <a:r>
+              <a:rPr lang="pt-BR" sz="3200" dirty="0">
+                <a:solidFill>
+                  <a:srgbClr val="800000"/>
+                </a:solidFill>
+                <a:latin typeface="Consolas" panose="020B0609020204030204" pitchFamily="49" charset="0"/>
+              </a:rPr>
+              <a:t>&lt;/li&gt;</a:t>
+            </a:r>
+            <a:endParaRPr lang="pt-BR" sz="3200" dirty="0">
+              <a:solidFill>
+                <a:srgbClr val="000000"/>
+              </a:solidFill>
+              <a:latin typeface="Consolas" panose="020B0609020204030204" pitchFamily="49" charset="0"/>
+            </a:endParaRPr>
+          </a:p>
+          <a:p>
+            <a:pPr marL="42863" indent="0">
+              <a:buNone/>
+            </a:pPr>
+            <a:r>
+              <a:rPr lang="pt-BR" sz="3200" dirty="0">
+                <a:solidFill>
+                  <a:srgbClr val="800000"/>
+                </a:solidFill>
+                <a:latin typeface="Consolas" panose="020B0609020204030204" pitchFamily="49" charset="0"/>
+              </a:rPr>
+              <a:t>	&lt;li&gt;</a:t>
+            </a:r>
+            <a:r>
+              <a:rPr lang="pt-BR" sz="3200" dirty="0">
+                <a:solidFill>
+                  <a:schemeClr val="tx1"/>
+                </a:solidFill>
+                <a:latin typeface="Consolas" panose="020B0609020204030204" pitchFamily="49" charset="0"/>
+              </a:rPr>
+              <a:t>Stir</a:t>
+            </a:r>
+            <a:r>
+              <a:rPr lang="pt-BR" sz="3200" dirty="0">
+                <a:solidFill>
+                  <a:srgbClr val="800000"/>
+                </a:solidFill>
+                <a:latin typeface="Consolas" panose="020B0609020204030204" pitchFamily="49" charset="0"/>
+              </a:rPr>
+              <a:t>&lt;/li&gt;</a:t>
+            </a:r>
+            <a:endParaRPr lang="pt-BR" sz="3200" dirty="0">
+              <a:solidFill>
+                <a:srgbClr val="000000"/>
+              </a:solidFill>
+              <a:latin typeface="Consolas" panose="020B0609020204030204" pitchFamily="49" charset="0"/>
+            </a:endParaRPr>
+          </a:p>
+          <a:p>
+            <a:pPr marL="42863" indent="0">
+              <a:buNone/>
+            </a:pPr>
+            <a:r>
+              <a:rPr lang="pt-BR" sz="3200" dirty="0">
+                <a:solidFill>
+                  <a:srgbClr val="800000"/>
+                </a:solidFill>
+                <a:latin typeface="Consolas" panose="020B0609020204030204" pitchFamily="49" charset="0"/>
+              </a:rPr>
+              <a:t>	&lt;li&gt;</a:t>
+            </a:r>
+            <a:r>
+              <a:rPr lang="pt-BR" sz="3200" dirty="0">
+                <a:solidFill>
+                  <a:schemeClr val="tx1"/>
+                </a:solidFill>
+                <a:latin typeface="Consolas" panose="020B0609020204030204" pitchFamily="49" charset="0"/>
+              </a:rPr>
+              <a:t>Bake for 5 mins</a:t>
+            </a:r>
+            <a:r>
+              <a:rPr lang="pt-BR" sz="3200" dirty="0">
+                <a:solidFill>
+                  <a:srgbClr val="800000"/>
+                </a:solidFill>
+                <a:latin typeface="Consolas" panose="020B0609020204030204" pitchFamily="49" charset="0"/>
+              </a:rPr>
+              <a:t>&lt;/li&gt;</a:t>
+            </a:r>
+          </a:p>
+          <a:p>
+            <a:pPr marL="42863" indent="0">
+              <a:buNone/>
+            </a:pPr>
+            <a:r>
+              <a:rPr lang="pt-BR" sz="3200" dirty="0">
+                <a:solidFill>
+                  <a:srgbClr val="800000"/>
+                </a:solidFill>
+                <a:latin typeface="Consolas" panose="020B0609020204030204" pitchFamily="49" charset="0"/>
+              </a:rPr>
+              <a:t>&lt;/ol&gt;</a:t>
+            </a:r>
+            <a:endParaRPr lang="pt-BR" sz="3200" dirty="0">
+              <a:solidFill>
+                <a:srgbClr val="000000"/>
+              </a:solidFill>
+              <a:latin typeface="Consolas" panose="020B0609020204030204" pitchFamily="49" charset="0"/>
+            </a:endParaRPr>
+          </a:p>
+        </p:txBody>
+      </p:sp>
+    </p:spTree>
+    <p:extLst>
+      <p:ext uri="{BB962C8B-B14F-4D97-AF65-F5344CB8AC3E}">
+        <p14:creationId xmlns:p14="http://schemas.microsoft.com/office/powerpoint/2010/main" val="2471837220"/>
+      </p:ext>
+    </p:extLst>
+  </p:cSld>
+  <p:clrMapOvr>
+    <a:masterClrMapping/>
+  </p:clrMapOvr>
+</p:sld>
+</file>
+
+<file path=ppt/slides/slide15.xml><?xml version="1.0" encoding="utf-8"?>
+<p:sld xmlns:a="http://schemas.openxmlformats.org/drawingml/2006/main" xmlns:r="http://schemas.openxmlformats.org/officeDocument/2006/relationships" xmlns:p="http://schemas.openxmlformats.org/presentationml/2006/main">
+  <p:cSld>
+    <p:spTree>
+      <p:nvGrpSpPr>
         <p:cNvPr id="1" name=""/>
         <p:cNvGrpSpPr/>
         <p:nvPr/>
@@ -6474,7 +7874,7 @@
           <a:p>
             <a:r>
               <a:rPr lang="en-US" dirty="0"/>
-              <a:t>10</a:t>
+              <a:t>14</a:t>
             </a:r>
           </a:p>
         </p:txBody>
@@ -6497,7 +7897,7 @@
         </p:spPr>
         <p:txBody>
           <a:bodyPr anchor="ctr">
-            <a:normAutofit fontScale="85000" lnSpcReduction="10000"/>
+            <a:normAutofit/>
           </a:bodyPr>
           <a:lstStyle/>
           <a:p>
@@ -6578,7 +7978,7 @@
                 </a:solidFill>
                 <a:latin typeface="Consolas" panose="020B0609020204030204" pitchFamily="49" charset="0"/>
               </a:rPr>
-              <a:t>Hello, world!</a:t>
+              <a:t>FORM</a:t>
             </a:r>
             <a:r>
               <a:rPr lang="en-US" sz="2700" dirty="0">
@@ -6625,7 +8025,7 @@
                 </a:solidFill>
                 <a:latin typeface="Consolas" panose="020B0609020204030204" pitchFamily="49" charset="0"/>
               </a:rPr>
-              <a:t>Here's a cool website!</a:t>
+              <a:t>Submit this form Please</a:t>
             </a:r>
             <a:r>
               <a:rPr lang="en-US" sz="2700" dirty="0">
@@ -6665,6 +8065,110 @@
               </a:rPr>
               <a:t>&lt;p&gt;</a:t>
             </a:r>
+            <a:r>
+              <a:rPr lang="en-US" sz="2700" dirty="0">
+                <a:solidFill>
+                  <a:schemeClr val="tx1"/>
+                </a:solidFill>
+                <a:latin typeface="Consolas" panose="020B0609020204030204" pitchFamily="49" charset="0"/>
+              </a:rPr>
+              <a:t>Name: </a:t>
+            </a:r>
+            <a:r>
+              <a:rPr lang="en-US" sz="2700" dirty="0">
+                <a:solidFill>
+                  <a:srgbClr val="800000"/>
+                </a:solidFill>
+                <a:latin typeface="Consolas" panose="020B0609020204030204" pitchFamily="49" charset="0"/>
+              </a:rPr>
+              <a:t>&lt;input </a:t>
+            </a:r>
+            <a:r>
+              <a:rPr lang="en-US" sz="2700" dirty="0">
+                <a:solidFill>
+                  <a:srgbClr val="FF0000"/>
+                </a:solidFill>
+                <a:latin typeface="Consolas" panose="020B0609020204030204" pitchFamily="49" charset="0"/>
+              </a:rPr>
+              <a:t>type</a:t>
+            </a:r>
+            <a:r>
+              <a:rPr lang="en-US" sz="2700" dirty="0">
+                <a:solidFill>
+                  <a:schemeClr val="tx1"/>
+                </a:solidFill>
+                <a:latin typeface="Consolas" panose="020B0609020204030204" pitchFamily="49" charset="0"/>
+              </a:rPr>
+              <a:t>=</a:t>
+            </a:r>
+            <a:r>
+              <a:rPr lang="en-US" sz="2700" dirty="0">
+                <a:solidFill>
+                  <a:srgbClr val="0000FF"/>
+                </a:solidFill>
+                <a:latin typeface="Consolas" panose="020B0609020204030204" pitchFamily="49" charset="0"/>
+              </a:rPr>
+              <a:t>"text"</a:t>
+            </a:r>
+            <a:r>
+              <a:rPr lang="en-US" sz="2700" dirty="0">
+                <a:solidFill>
+                  <a:srgbClr val="800000"/>
+                </a:solidFill>
+                <a:latin typeface="Consolas" panose="020B0609020204030204" pitchFamily="49" charset="0"/>
+              </a:rPr>
+              <a:t>&gt;&lt;/p&gt;</a:t>
+            </a:r>
+          </a:p>
+          <a:p>
+            <a:pPr marL="42863" indent="0">
+              <a:buNone/>
+            </a:pPr>
+            <a:r>
+              <a:rPr lang="en-US" sz="2700" dirty="0">
+                <a:solidFill>
+                  <a:srgbClr val="800000"/>
+                </a:solidFill>
+                <a:latin typeface="Consolas" panose="020B0609020204030204" pitchFamily="49" charset="0"/>
+              </a:rPr>
+              <a:t>    &lt;input </a:t>
+            </a:r>
+            <a:r>
+              <a:rPr lang="en-US" sz="2700" dirty="0">
+                <a:solidFill>
+                  <a:srgbClr val="FF0000"/>
+                </a:solidFill>
+                <a:latin typeface="Consolas" panose="020B0609020204030204" pitchFamily="49" charset="0"/>
+              </a:rPr>
+              <a:t>type</a:t>
+            </a:r>
+            <a:r>
+              <a:rPr lang="en-US" sz="2700" dirty="0">
+                <a:solidFill>
+                  <a:schemeClr val="tx1"/>
+                </a:solidFill>
+                <a:latin typeface="Consolas" panose="020B0609020204030204" pitchFamily="49" charset="0"/>
+              </a:rPr>
+              <a:t>=</a:t>
+            </a:r>
+            <a:r>
+              <a:rPr lang="en-US" sz="2700" dirty="0">
+                <a:solidFill>
+                  <a:srgbClr val="0000FF"/>
+                </a:solidFill>
+                <a:latin typeface="Consolas" panose="020B0609020204030204" pitchFamily="49" charset="0"/>
+              </a:rPr>
+              <a:t>"submit"</a:t>
+            </a:r>
+            <a:r>
+              <a:rPr lang="en-US" sz="2700" dirty="0">
+                <a:solidFill>
+                  <a:srgbClr val="800000"/>
+                </a:solidFill>
+                <a:latin typeface="Consolas" panose="020B0609020204030204" pitchFamily="49" charset="0"/>
+              </a:rPr>
+              <a:t>&gt;</a:t>
+            </a:r>
             <a:endParaRPr lang="en-US" sz="2700" dirty="0">
               <a:solidFill>
                 <a:srgbClr val="000000"/>
@@ -6683,7 +8187,7 @@
                 </a:solidFill>
                 <a:latin typeface="Consolas" panose="020B0609020204030204" pitchFamily="49" charset="0"/>
               </a:rPr>
-              <a:t>      </a:t>
+              <a:t>  </a:t>
             </a:r>
             <a:r>
               <a:rPr lang="en-US" sz="2700" dirty="0">
@@ -6692,70 +8196,7 @@
                 </a:solidFill>
                 <a:latin typeface="Consolas" panose="020B0609020204030204" pitchFamily="49" charset="0"/>
               </a:rPr>
-              <a:t>&lt;a</a:t>
-            </a:r>
-            <a:r>
-              <a:rPr lang="en-US" sz="2700" dirty="0">
-                <a:solidFill>
-                  <a:srgbClr val="000000"/>
-                </a:solidFill>
-                <a:latin typeface="Consolas" panose="020B0609020204030204" pitchFamily="49" charset="0"/>
-              </a:rPr>
-              <a:t> </a:t>
-            </a:r>
-            <a:r>
-              <a:rPr lang="en-US" sz="2700" dirty="0" err="1">
-                <a:solidFill>
-                  <a:srgbClr val="FF0000"/>
-                </a:solidFill>
-                <a:latin typeface="Consolas" panose="020B0609020204030204" pitchFamily="49" charset="0"/>
-              </a:rPr>
-              <a:t>href</a:t>
-            </a:r>
-            <a:r>
-              <a:rPr lang="en-US" sz="2700" dirty="0">
-                <a:solidFill>
-                  <a:srgbClr val="000000"/>
-                </a:solidFill>
-                <a:latin typeface="Consolas" panose="020B0609020204030204" pitchFamily="49" charset="0"/>
-              </a:rPr>
-              <a:t>=</a:t>
-            </a:r>
-            <a:r>
-              <a:rPr lang="en-US" sz="2700" dirty="0">
-                <a:solidFill>
-                  <a:srgbClr val="0000FF"/>
-                </a:solidFill>
-                <a:latin typeface="Consolas" panose="020B0609020204030204" pitchFamily="49" charset="0"/>
-              </a:rPr>
-              <a:t>"http://youtube.com"</a:t>
-            </a:r>
-            <a:r>
-              <a:rPr lang="en-US" sz="2700" dirty="0">
-                <a:solidFill>
-                  <a:srgbClr val="800000"/>
-                </a:solidFill>
-                <a:latin typeface="Consolas" panose="020B0609020204030204" pitchFamily="49" charset="0"/>
-              </a:rPr>
-              <a:t>&gt;</a:t>
-            </a:r>
-            <a:r>
-              <a:rPr lang="en-US" sz="2700" dirty="0">
-                <a:solidFill>
-                  <a:srgbClr val="000000"/>
-                </a:solidFill>
-                <a:latin typeface="Consolas" panose="020B0609020204030204" pitchFamily="49" charset="0"/>
-              </a:rPr>
-              <a:t>YouTube</a:t>
-            </a:r>
-            <a:r>
-              <a:rPr lang="en-US" sz="2700" dirty="0">
-                <a:solidFill>
-                  <a:srgbClr val="800000"/>
-                </a:solidFill>
-                <a:latin typeface="Consolas" panose="020B0609020204030204" pitchFamily="49" charset="0"/>
-              </a:rPr>
-              <a:t>&lt;/a&gt;</a:t>
+              <a:t>&lt;/body&gt;</a:t>
             </a:r>
             <a:endParaRPr lang="en-US" sz="2700" dirty="0">
               <a:solidFill>
@@ -6771,83 +8212,11 @@
             <a:r>
               <a:rPr lang="en-US" sz="2700" dirty="0">
                 <a:solidFill>
-                  <a:srgbClr val="000000"/>
-                </a:solidFill>
-                <a:latin typeface="Consolas" panose="020B0609020204030204" pitchFamily="49" charset="0"/>
-              </a:rPr>
-              <a:t>      </a:t>
-            </a:r>
-            <a:r>
-              <a:rPr lang="en-US" sz="2700" dirty="0">
-                <a:solidFill>
                   <a:srgbClr val="800000"/>
                 </a:solidFill>
                 <a:latin typeface="Consolas" panose="020B0609020204030204" pitchFamily="49" charset="0"/>
               </a:rPr>
-              <a:t>&lt;</a:t>
-            </a:r>
-            <a:r>
-              <a:rPr lang="en-US" sz="2700" dirty="0" err="1">
-                <a:solidFill>
-                  <a:srgbClr val="800000"/>
-                </a:solidFill>
-                <a:latin typeface="Consolas" panose="020B0609020204030204" pitchFamily="49" charset="0"/>
-              </a:rPr>
-              <a:t>img</a:t>
-            </a:r>
-            <a:r>
-              <a:rPr lang="en-US" sz="2700" dirty="0">
-                <a:solidFill>
-                  <a:srgbClr val="000000"/>
-                </a:solidFill>
-                <a:latin typeface="Consolas" panose="020B0609020204030204" pitchFamily="49" charset="0"/>
-              </a:rPr>
-              <a:t> </a:t>
-            </a:r>
-            <a:r>
-              <a:rPr lang="en-US" sz="2700" dirty="0" err="1">
-                <a:solidFill>
-                  <a:srgbClr val="FF0000"/>
-                </a:solidFill>
-                <a:latin typeface="Consolas" panose="020B0609020204030204" pitchFamily="49" charset="0"/>
-              </a:rPr>
-              <a:t>src</a:t>
-            </a:r>
-            <a:r>
-              <a:rPr lang="en-US" sz="2700" dirty="0">
-                <a:solidFill>
-                  <a:srgbClr val="000000"/>
-                </a:solidFill>
-                <a:latin typeface="Consolas" panose="020B0609020204030204" pitchFamily="49" charset="0"/>
-              </a:rPr>
-              <a:t>=</a:t>
-            </a:r>
-            <a:r>
-              <a:rPr lang="en-US" sz="2700" dirty="0">
-                <a:solidFill>
-                  <a:srgbClr val="0000FF"/>
-                </a:solidFill>
-                <a:latin typeface="Consolas" panose="020B0609020204030204" pitchFamily="49" charset="0"/>
-              </a:rPr>
-              <a:t>"http://example.com/smiley.png"</a:t>
-            </a:r>
-            <a:r>
-              <a:rPr lang="en-US" sz="2700" dirty="0">
-                <a:solidFill>
-                  <a:srgbClr val="000000"/>
-                </a:solidFill>
-                <a:latin typeface="Consolas" panose="020B0609020204030204" pitchFamily="49" charset="0"/>
-              </a:rPr>
-              <a:t> </a:t>
-            </a:r>
-            <a:r>
-              <a:rPr lang="en-US" sz="2700" dirty="0">
-                <a:solidFill>
-                  <a:srgbClr val="800000"/>
-                </a:solidFill>
-                <a:latin typeface="Consolas" panose="020B0609020204030204" pitchFamily="49" charset="0"/>
-              </a:rPr>
-              <a:t>/&gt;</a:t>
+              <a:t>&lt;/html&gt;</a:t>
             </a:r>
             <a:endParaRPr lang="en-US" sz="2700" dirty="0">
               <a:solidFill>
@@ -6856,6 +8225,99 @@
               <a:latin typeface="Consolas" panose="020B0609020204030204" pitchFamily="49" charset="0"/>
             </a:endParaRPr>
           </a:p>
+        </p:txBody>
+      </p:sp>
+    </p:spTree>
+    <p:extLst>
+      <p:ext uri="{BB962C8B-B14F-4D97-AF65-F5344CB8AC3E}">
+        <p14:creationId xmlns:p14="http://schemas.microsoft.com/office/powerpoint/2010/main" val="2504364791"/>
+      </p:ext>
+    </p:extLst>
+  </p:cSld>
+  <p:clrMapOvr>
+    <a:masterClrMapping/>
+  </p:clrMapOvr>
+</p:sld>
+</file>
+
+<file path=ppt/slides/slide16.xml><?xml version="1.0" encoding="utf-8"?>
+<p:sld xmlns:a="http://schemas.openxmlformats.org/drawingml/2006/main" xmlns:r="http://schemas.openxmlformats.org/officeDocument/2006/relationships" xmlns:p="http://schemas.openxmlformats.org/presentationml/2006/main">
+  <p:cSld>
+    <p:spTree>
+      <p:nvGrpSpPr>
+        <p:cNvPr id="1" name="">
+          <a:extLst>
+            <a:ext uri="{FF2B5EF4-FFF2-40B4-BE49-F238E27FC236}">
+              <a16:creationId xmlns:a16="http://schemas.microsoft.com/office/drawing/2014/main" id="{9C0BCCE8-FBBF-41A3-70BF-AF09B6BD5485}"/>
+            </a:ext>
+          </a:extLst>
+        </p:cNvPr>
+        <p:cNvGrpSpPr/>
+        <p:nvPr/>
+      </p:nvGrpSpPr>
+      <p:grpSpPr>
+        <a:xfrm>
+          <a:off x="0" y="0"/>
+          <a:ext cx="0" cy="0"/>
+          <a:chOff x="0" y="0"/>
+          <a:chExt cx="0" cy="0"/>
+        </a:xfrm>
+      </p:grpSpPr>
+      <p:sp>
+        <p:nvSpPr>
+          <p:cNvPr id="2" name="Title 1">
+            <a:extLst>
+              <a:ext uri="{FF2B5EF4-FFF2-40B4-BE49-F238E27FC236}">
+                <a16:creationId xmlns:a16="http://schemas.microsoft.com/office/drawing/2014/main" id="{0DFEDC42-5992-3B96-6EE1-780C9086FBBE}"/>
+              </a:ext>
+            </a:extLst>
+          </p:cNvPr>
+          <p:cNvSpPr>
+            <a:spLocks noGrp="1"/>
+          </p:cNvSpPr>
+          <p:nvPr>
+            <p:ph type="title"/>
+          </p:nvPr>
+        </p:nvSpPr>
+        <p:spPr/>
+        <p:txBody>
+          <a:bodyPr/>
+          <a:lstStyle/>
+          <a:p>
+            <a:r>
+              <a:rPr lang="en-US" dirty="0"/>
+              <a:t>15</a:t>
+            </a:r>
+          </a:p>
+        </p:txBody>
+      </p:sp>
+      <p:sp>
+        <p:nvSpPr>
+          <p:cNvPr id="3" name="Content Placeholder 2">
+            <a:extLst>
+              <a:ext uri="{FF2B5EF4-FFF2-40B4-BE49-F238E27FC236}">
+                <a16:creationId xmlns:a16="http://schemas.microsoft.com/office/drawing/2014/main" id="{023AD2C7-B4A7-98EE-87CC-E967F3BE1AB9}"/>
+              </a:ext>
+            </a:extLst>
+          </p:cNvPr>
+          <p:cNvSpPr>
+            <a:spLocks noGrp="1"/>
+          </p:cNvSpPr>
+          <p:nvPr>
+            <p:ph idx="4294967295"/>
+          </p:nvPr>
+        </p:nvSpPr>
+        <p:spPr>
+          <a:xfrm>
+            <a:off x="581890" y="1152525"/>
+            <a:ext cx="8104909" cy="3641148"/>
+          </a:xfrm>
+        </p:spPr>
+        <p:txBody>
+          <a:bodyPr anchor="ctr">
+            <a:normAutofit fontScale="85000" lnSpcReduction="10000"/>
+          </a:bodyPr>
+          <a:lstStyle/>
           <a:p>
             <a:pPr marL="42863" indent="0">
               <a:buNone/>
@@ -6863,20 +8325,11 @@
             <a:r>
               <a:rPr lang="en-US" sz="2700" dirty="0">
                 <a:solidFill>
-                  <a:srgbClr val="000000"/>
-                </a:solidFill>
-                <a:latin typeface="Consolas" panose="020B0609020204030204" pitchFamily="49" charset="0"/>
-              </a:rPr>
-              <a:t>    </a:t>
-            </a:r>
-            <a:r>
-              <a:rPr lang="en-US" sz="2700" dirty="0">
-                <a:solidFill>
                   <a:srgbClr val="800000"/>
                 </a:solidFill>
                 <a:latin typeface="Consolas" panose="020B0609020204030204" pitchFamily="49" charset="0"/>
               </a:rPr>
-              <a:t>&lt;/p&gt;</a:t>
+              <a:t>&lt;html&gt;</a:t>
             </a:r>
             <a:endParaRPr lang="en-US" sz="2700" dirty="0">
               <a:solidFill>
@@ -6896,7 +8349,7 @@
                 </a:solidFill>
                 <a:latin typeface="Consolas" panose="020B0609020204030204" pitchFamily="49" charset="0"/>
               </a:rPr>
-              <a:t>  </a:t>
+              <a:t>  </a:t>
             </a:r>
             <a:r>
               <a:rPr lang="en-US" sz="2700" dirty="0">
@@ -6905,7 +8358,7 @@
                 </a:solidFill>
                 <a:latin typeface="Consolas" panose="020B0609020204030204" pitchFamily="49" charset="0"/>
               </a:rPr>
-              <a:t>&lt;/body&gt;</a:t>
+              <a:t>&lt;body&gt;</a:t>
             </a:r>
             <a:endParaRPr lang="en-US" sz="2700" dirty="0">
               <a:solidFill>
@@ -6921,11 +8374,38 @@
             <a:r>
               <a:rPr lang="en-US" sz="2700" dirty="0">
                 <a:solidFill>
+                  <a:srgbClr val="000000"/>
+                </a:solidFill>
+                <a:latin typeface="Consolas" panose="020B0609020204030204" pitchFamily="49" charset="0"/>
+              </a:rPr>
+              <a:t>    </a:t>
+            </a:r>
+            <a:r>
+              <a:rPr lang="en-US" sz="2700" dirty="0">
+                <a:solidFill>
                   <a:srgbClr val="800000"/>
                 </a:solidFill>
                 <a:latin typeface="Consolas" panose="020B0609020204030204" pitchFamily="49" charset="0"/>
               </a:rPr>
-              <a:t>&lt;/html&gt;</a:t>
+              <a:t>&lt;h1&gt;</a:t>
+            </a:r>
+            <a:r>
+              <a:rPr lang="en-US" sz="2700" dirty="0">
+                <a:solidFill>
+                  <a:srgbClr val="000000"/>
+                </a:solidFill>
+                <a:latin typeface="Consolas" panose="020B0609020204030204" pitchFamily="49" charset="0"/>
+              </a:rPr>
+              <a:t>Hello, world!</a:t>
+            </a:r>
+            <a:r>
+              <a:rPr lang="en-US" sz="2700" dirty="0">
+                <a:solidFill>
+                  <a:srgbClr val="800000"/>
+                </a:solidFill>
+                <a:latin typeface="Consolas" panose="020B0609020204030204" pitchFamily="49" charset="0"/>
+              </a:rPr>
+              <a:t>&lt;/h1&gt;</a:t>
             </a:r>
             <a:endParaRPr lang="en-US" sz="2700" dirty="0">
               <a:solidFill>
@@ -6934,12 +8414,350 @@
               <a:latin typeface="Consolas" panose="020B0609020204030204" pitchFamily="49" charset="0"/>
             </a:endParaRPr>
           </a:p>
+          <a:p>
+            <a:pPr marL="42863" indent="0">
+              <a:buNone/>
+            </a:pPr>
+            <a:r>
+              <a:rPr lang="en-US" sz="2700" dirty="0">
+                <a:solidFill>
+                  <a:srgbClr val="000000"/>
+                </a:solidFill>
+                <a:latin typeface="Consolas" panose="020B0609020204030204" pitchFamily="49" charset="0"/>
+              </a:rPr>
+              <a:t>    </a:t>
+            </a:r>
+            <a:r>
+              <a:rPr lang="en-US" sz="2700" dirty="0">
+                <a:solidFill>
+                  <a:srgbClr val="800000"/>
+                </a:solidFill>
+                <a:latin typeface="Consolas" panose="020B0609020204030204" pitchFamily="49" charset="0"/>
+              </a:rPr>
+              <a:t>&lt;p&gt;</a:t>
+            </a:r>
+            <a:r>
+              <a:rPr lang="en-US" sz="2700" dirty="0">
+                <a:solidFill>
+                  <a:srgbClr val="000000"/>
+                </a:solidFill>
+                <a:latin typeface="Consolas" panose="020B0609020204030204" pitchFamily="49" charset="0"/>
+              </a:rPr>
+              <a:t>Here's a cool website!</a:t>
+            </a:r>
+            <a:r>
+              <a:rPr lang="en-US" sz="2700" dirty="0">
+                <a:solidFill>
+                  <a:srgbClr val="800000"/>
+                </a:solidFill>
+                <a:latin typeface="Consolas" panose="020B0609020204030204" pitchFamily="49" charset="0"/>
+              </a:rPr>
+              <a:t>&lt;/p&gt;</a:t>
+            </a:r>
+            <a:endParaRPr lang="en-US" sz="2700" dirty="0">
+              <a:solidFill>
+                <a:srgbClr val="000000"/>
+              </a:solidFill>
+              <a:latin typeface="Consolas" panose="020B0609020204030204" pitchFamily="49" charset="0"/>
+            </a:endParaRPr>
+          </a:p>
+          <a:p>
+            <a:pPr marL="42863" indent="0">
+              <a:buNone/>
+            </a:pPr>
+            <a:r>
+              <a:rPr lang="en-US" sz="2700" dirty="0">
+                <a:solidFill>
+                  <a:srgbClr val="000000"/>
+                </a:solidFill>
+                <a:latin typeface="Consolas" panose="020B0609020204030204" pitchFamily="49" charset="0"/>
+              </a:rPr>
+              <a:t>    </a:t>
+            </a:r>
+            <a:r>
+              <a:rPr lang="en-US" sz="2700" dirty="0">
+                <a:solidFill>
+                  <a:srgbClr val="800000"/>
+                </a:solidFill>
+                <a:latin typeface="Consolas" panose="020B0609020204030204" pitchFamily="49" charset="0"/>
+              </a:rPr>
+              <a:t>&lt;p&gt;</a:t>
+            </a:r>
+            <a:endParaRPr lang="en-US" sz="2700" dirty="0">
+              <a:solidFill>
+                <a:srgbClr val="000000"/>
+              </a:solidFill>
+              <a:latin typeface="Consolas" panose="020B0609020204030204" pitchFamily="49" charset="0"/>
+            </a:endParaRPr>
+          </a:p>
+          <a:p>
+            <a:pPr marL="42863" indent="0">
+              <a:buNone/>
+            </a:pPr>
+            <a:r>
+              <a:rPr lang="en-US" sz="2700" dirty="0">
+                <a:solidFill>
+                  <a:srgbClr val="000000"/>
+                </a:solidFill>
+                <a:latin typeface="Consolas" panose="020B0609020204030204" pitchFamily="49" charset="0"/>
+              </a:rPr>
+              <a:t>      </a:t>
+            </a:r>
+            <a:r>
+              <a:rPr lang="en-US" sz="2700" dirty="0">
+                <a:solidFill>
+                  <a:srgbClr val="800000"/>
+                </a:solidFill>
+                <a:latin typeface="Consolas" panose="020B0609020204030204" pitchFamily="49" charset="0"/>
+              </a:rPr>
+              <a:t>&lt;a</a:t>
+            </a:r>
+            <a:r>
+              <a:rPr lang="en-US" sz="2700" dirty="0">
+                <a:solidFill>
+                  <a:srgbClr val="000000"/>
+                </a:solidFill>
+                <a:latin typeface="Consolas" panose="020B0609020204030204" pitchFamily="49" charset="0"/>
+              </a:rPr>
+              <a:t> </a:t>
+            </a:r>
+            <a:r>
+              <a:rPr lang="en-US" sz="2700" dirty="0" err="1">
+                <a:solidFill>
+                  <a:srgbClr val="FF0000"/>
+                </a:solidFill>
+                <a:latin typeface="Consolas" panose="020B0609020204030204" pitchFamily="49" charset="0"/>
+              </a:rPr>
+              <a:t>href</a:t>
+            </a:r>
+            <a:r>
+              <a:rPr lang="en-US" sz="2700" dirty="0">
+                <a:solidFill>
+                  <a:srgbClr val="000000"/>
+                </a:solidFill>
+                <a:latin typeface="Consolas" panose="020B0609020204030204" pitchFamily="49" charset="0"/>
+              </a:rPr>
+              <a:t>=</a:t>
+            </a:r>
+            <a:r>
+              <a:rPr lang="en-US" sz="2700" dirty="0">
+                <a:solidFill>
+                  <a:srgbClr val="0000FF"/>
+                </a:solidFill>
+                <a:latin typeface="Consolas" panose="020B0609020204030204" pitchFamily="49" charset="0"/>
+              </a:rPr>
+              <a:t>"http://youtube.com"</a:t>
+            </a:r>
+            <a:r>
+              <a:rPr lang="en-US" sz="2700" dirty="0">
+                <a:solidFill>
+                  <a:srgbClr val="800000"/>
+                </a:solidFill>
+                <a:latin typeface="Consolas" panose="020B0609020204030204" pitchFamily="49" charset="0"/>
+              </a:rPr>
+              <a:t>&gt;</a:t>
+            </a:r>
+            <a:r>
+              <a:rPr lang="en-US" sz="2700" dirty="0">
+                <a:solidFill>
+                  <a:srgbClr val="000000"/>
+                </a:solidFill>
+                <a:latin typeface="Consolas" panose="020B0609020204030204" pitchFamily="49" charset="0"/>
+              </a:rPr>
+              <a:t>YouTube</a:t>
+            </a:r>
+            <a:r>
+              <a:rPr lang="en-US" sz="2700" dirty="0">
+                <a:solidFill>
+                  <a:srgbClr val="800000"/>
+                </a:solidFill>
+                <a:latin typeface="Consolas" panose="020B0609020204030204" pitchFamily="49" charset="0"/>
+              </a:rPr>
+              <a:t>&lt;/a&gt;</a:t>
+            </a:r>
+            <a:endParaRPr lang="en-US" sz="2700" dirty="0">
+              <a:solidFill>
+                <a:srgbClr val="000000"/>
+              </a:solidFill>
+              <a:latin typeface="Consolas" panose="020B0609020204030204" pitchFamily="49" charset="0"/>
+            </a:endParaRPr>
+          </a:p>
+          <a:p>
+            <a:pPr marL="42863" indent="0">
+              <a:buNone/>
+            </a:pPr>
+            <a:r>
+              <a:rPr lang="en-US" sz="2700" dirty="0">
+                <a:solidFill>
+                  <a:srgbClr val="000000"/>
+                </a:solidFill>
+                <a:latin typeface="Consolas" panose="020B0609020204030204" pitchFamily="49" charset="0"/>
+              </a:rPr>
+              <a:t>      </a:t>
+            </a:r>
+            <a:r>
+              <a:rPr lang="en-US" sz="2700" dirty="0">
+                <a:solidFill>
+                  <a:srgbClr val="800000"/>
+                </a:solidFill>
+                <a:latin typeface="Consolas" panose="020B0609020204030204" pitchFamily="49" charset="0"/>
+              </a:rPr>
+              <a:t>&lt;</a:t>
+            </a:r>
+            <a:r>
+              <a:rPr lang="en-US" sz="2700" dirty="0" err="1">
+                <a:solidFill>
+                  <a:srgbClr val="800000"/>
+                </a:solidFill>
+                <a:latin typeface="Consolas" panose="020B0609020204030204" pitchFamily="49" charset="0"/>
+              </a:rPr>
+              <a:t>img</a:t>
+            </a:r>
+            <a:r>
+              <a:rPr lang="en-US" sz="2700" dirty="0">
+                <a:solidFill>
+                  <a:srgbClr val="000000"/>
+                </a:solidFill>
+                <a:latin typeface="Consolas" panose="020B0609020204030204" pitchFamily="49" charset="0"/>
+              </a:rPr>
+              <a:t> </a:t>
+            </a:r>
+            <a:r>
+              <a:rPr lang="en-US" sz="2700" dirty="0" err="1">
+                <a:solidFill>
+                  <a:srgbClr val="FF0000"/>
+                </a:solidFill>
+                <a:latin typeface="Consolas" panose="020B0609020204030204" pitchFamily="49" charset="0"/>
+              </a:rPr>
+              <a:t>src</a:t>
+            </a:r>
+            <a:r>
+              <a:rPr lang="en-US" sz="2700" dirty="0">
+                <a:solidFill>
+                  <a:srgbClr val="000000"/>
+                </a:solidFill>
+                <a:latin typeface="Consolas" panose="020B0609020204030204" pitchFamily="49" charset="0"/>
+              </a:rPr>
+              <a:t>=</a:t>
+            </a:r>
+            <a:r>
+              <a:rPr lang="en-US" sz="2700" dirty="0">
+                <a:solidFill>
+                  <a:srgbClr val="0000FF"/>
+                </a:solidFill>
+                <a:latin typeface="Consolas" panose="020B0609020204030204" pitchFamily="49" charset="0"/>
+              </a:rPr>
+              <a:t>"http://example.com/smiley.png"</a:t>
+            </a:r>
+            <a:r>
+              <a:rPr lang="en-US" sz="2700" dirty="0">
+                <a:solidFill>
+                  <a:srgbClr val="000000"/>
+                </a:solidFill>
+                <a:latin typeface="Consolas" panose="020B0609020204030204" pitchFamily="49" charset="0"/>
+              </a:rPr>
+              <a:t> </a:t>
+            </a:r>
+            <a:r>
+              <a:rPr lang="en-US" sz="2700" dirty="0">
+                <a:solidFill>
+                  <a:srgbClr val="800000"/>
+                </a:solidFill>
+                <a:latin typeface="Consolas" panose="020B0609020204030204" pitchFamily="49" charset="0"/>
+              </a:rPr>
+              <a:t>/&gt;</a:t>
+            </a:r>
+            <a:endParaRPr lang="en-US" sz="2700" dirty="0">
+              <a:solidFill>
+                <a:srgbClr val="000000"/>
+              </a:solidFill>
+              <a:latin typeface="Consolas" panose="020B0609020204030204" pitchFamily="49" charset="0"/>
+            </a:endParaRPr>
+          </a:p>
+          <a:p>
+            <a:pPr marL="42863" indent="0">
+              <a:buNone/>
+            </a:pPr>
+            <a:r>
+              <a:rPr lang="en-US" sz="2700" dirty="0">
+                <a:solidFill>
+                  <a:srgbClr val="000000"/>
+                </a:solidFill>
+                <a:latin typeface="Consolas" panose="020B0609020204030204" pitchFamily="49" charset="0"/>
+              </a:rPr>
+              <a:t>    </a:t>
+            </a:r>
+            <a:r>
+              <a:rPr lang="en-US" sz="2700" dirty="0">
+                <a:solidFill>
+                  <a:srgbClr val="800000"/>
+                </a:solidFill>
+                <a:latin typeface="Consolas" panose="020B0609020204030204" pitchFamily="49" charset="0"/>
+              </a:rPr>
+              <a:t>&lt;/p&gt;</a:t>
+            </a:r>
+            <a:endParaRPr lang="en-US" sz="2700" dirty="0">
+              <a:solidFill>
+                <a:srgbClr val="000000"/>
+              </a:solidFill>
+              <a:latin typeface="Consolas" panose="020B0609020204030204" pitchFamily="49" charset="0"/>
+            </a:endParaRPr>
+          </a:p>
+          <a:p>
+            <a:pPr marL="42863" indent="0">
+              <a:buNone/>
+            </a:pPr>
+            <a:r>
+              <a:rPr lang="en-US" sz="2700" dirty="0">
+                <a:solidFill>
+                  <a:srgbClr val="000000"/>
+                </a:solidFill>
+                <a:latin typeface="Consolas" panose="020B0609020204030204" pitchFamily="49" charset="0"/>
+              </a:rPr>
+              <a:t>  </a:t>
+            </a:r>
+            <a:r>
+              <a:rPr lang="en-US" sz="2700" dirty="0">
+                <a:solidFill>
+                  <a:srgbClr val="800000"/>
+                </a:solidFill>
+                <a:latin typeface="Consolas" panose="020B0609020204030204" pitchFamily="49" charset="0"/>
+              </a:rPr>
+              <a:t>&lt;/body&gt;</a:t>
+            </a:r>
+            <a:endParaRPr lang="en-US" sz="2700" dirty="0">
+              <a:solidFill>
+                <a:srgbClr val="000000"/>
+              </a:solidFill>
+              <a:latin typeface="Consolas" panose="020B0609020204030204" pitchFamily="49" charset="0"/>
+            </a:endParaRPr>
+          </a:p>
+          <a:p>
+            <a:pPr marL="42863" indent="0">
+              <a:buNone/>
+            </a:pPr>
+            <a:r>
+              <a:rPr lang="en-US" sz="2700" dirty="0">
+                <a:solidFill>
+                  <a:srgbClr val="800000"/>
+                </a:solidFill>
+                <a:latin typeface="Consolas" panose="020B0609020204030204" pitchFamily="49" charset="0"/>
+              </a:rPr>
+              <a:t>&lt;/html&gt;</a:t>
+            </a:r>
+            <a:endParaRPr lang="en-US" sz="2700" dirty="0">
+              <a:solidFill>
+                <a:srgbClr val="000000"/>
+              </a:solidFill>
+              <a:latin typeface="Consolas" panose="020B0609020204030204" pitchFamily="49" charset="0"/>
+            </a:endParaRPr>
+          </a:p>
         </p:txBody>
       </p:sp>
     </p:spTree>
     <p:extLst>
       <p:ext uri="{BB962C8B-B14F-4D97-AF65-F5344CB8AC3E}">
-        <p14:creationId xmlns:p14="http://schemas.microsoft.com/office/powerpoint/2010/main" val="2504364791"/>
+        <p14:creationId xmlns:p14="http://schemas.microsoft.com/office/powerpoint/2010/main" val="2137569763"/>
       </p:ext>
     </p:extLst>
   </p:cSld>

</xml_diff>